<commit_message>
new pnas draft; new poster
</commit_message>
<xml_diff>
--- a/docs/draft_pnas/jan figures/figure 1.pptx
+++ b/docs/draft_pnas/jan figures/figure 1.pptx
@@ -288,7 +288,8 @@
           <a:p>
             <a:fld id="{BA7ADF44-F693-C841-9EBB-954F27654D1F}" type="datetimeFigureOut">
               <a:rPr lang="en-US" smtClean="0"/>
-              <a:t>6/3/14</a:t>
+              <a:pPr/>
+              <a:t>6/4/14</a:t>
             </a:fld>
             <a:endParaRPr lang="en-US"/>
           </a:p>
@@ -330,6 +331,7 @@
           <a:p>
             <a:fld id="{12DAF1D1-98A2-F94A-B1C7-63D8AC0F5DFC}" type="slidenum">
               <a:rPr lang="en-US" smtClean="0"/>
+              <a:pPr/>
               <a:t>‹#›</a:t>
             </a:fld>
             <a:endParaRPr lang="en-US"/>
@@ -453,7 +455,8 @@
           <a:p>
             <a:fld id="{BA7ADF44-F693-C841-9EBB-954F27654D1F}" type="datetimeFigureOut">
               <a:rPr lang="en-US" smtClean="0"/>
-              <a:t>6/3/14</a:t>
+              <a:pPr/>
+              <a:t>6/4/14</a:t>
             </a:fld>
             <a:endParaRPr lang="en-US"/>
           </a:p>
@@ -495,6 +498,7 @@
           <a:p>
             <a:fld id="{12DAF1D1-98A2-F94A-B1C7-63D8AC0F5DFC}" type="slidenum">
               <a:rPr lang="en-US" smtClean="0"/>
+              <a:pPr/>
               <a:t>‹#›</a:t>
             </a:fld>
             <a:endParaRPr lang="en-US"/>
@@ -628,7 +632,8 @@
           <a:p>
             <a:fld id="{BA7ADF44-F693-C841-9EBB-954F27654D1F}" type="datetimeFigureOut">
               <a:rPr lang="en-US" smtClean="0"/>
-              <a:t>6/3/14</a:t>
+              <a:pPr/>
+              <a:t>6/4/14</a:t>
             </a:fld>
             <a:endParaRPr lang="en-US"/>
           </a:p>
@@ -670,6 +675,7 @@
           <a:p>
             <a:fld id="{12DAF1D1-98A2-F94A-B1C7-63D8AC0F5DFC}" type="slidenum">
               <a:rPr lang="en-US" smtClean="0"/>
+              <a:pPr/>
               <a:t>‹#›</a:t>
             </a:fld>
             <a:endParaRPr lang="en-US"/>
@@ -793,7 +799,8 @@
           <a:p>
             <a:fld id="{BA7ADF44-F693-C841-9EBB-954F27654D1F}" type="datetimeFigureOut">
               <a:rPr lang="en-US" smtClean="0"/>
-              <a:t>6/3/14</a:t>
+              <a:pPr/>
+              <a:t>6/4/14</a:t>
             </a:fld>
             <a:endParaRPr lang="en-US"/>
           </a:p>
@@ -835,6 +842,7 @@
           <a:p>
             <a:fld id="{12DAF1D1-98A2-F94A-B1C7-63D8AC0F5DFC}" type="slidenum">
               <a:rPr lang="en-US" smtClean="0"/>
+              <a:pPr/>
               <a:t>‹#›</a:t>
             </a:fld>
             <a:endParaRPr lang="en-US"/>
@@ -1034,7 +1042,8 @@
           <a:p>
             <a:fld id="{BA7ADF44-F693-C841-9EBB-954F27654D1F}" type="datetimeFigureOut">
               <a:rPr lang="en-US" smtClean="0"/>
-              <a:t>6/3/14</a:t>
+              <a:pPr/>
+              <a:t>6/4/14</a:t>
             </a:fld>
             <a:endParaRPr lang="en-US"/>
           </a:p>
@@ -1076,6 +1085,7 @@
           <a:p>
             <a:fld id="{12DAF1D1-98A2-F94A-B1C7-63D8AC0F5DFC}" type="slidenum">
               <a:rPr lang="en-US" smtClean="0"/>
+              <a:pPr/>
               <a:t>‹#›</a:t>
             </a:fld>
             <a:endParaRPr lang="en-US"/>
@@ -1317,7 +1327,8 @@
           <a:p>
             <a:fld id="{BA7ADF44-F693-C841-9EBB-954F27654D1F}" type="datetimeFigureOut">
               <a:rPr lang="en-US" smtClean="0"/>
-              <a:t>6/3/14</a:t>
+              <a:pPr/>
+              <a:t>6/4/14</a:t>
             </a:fld>
             <a:endParaRPr lang="en-US"/>
           </a:p>
@@ -1359,6 +1370,7 @@
           <a:p>
             <a:fld id="{12DAF1D1-98A2-F94A-B1C7-63D8AC0F5DFC}" type="slidenum">
               <a:rPr lang="en-US" smtClean="0"/>
+              <a:pPr/>
               <a:t>‹#›</a:t>
             </a:fld>
             <a:endParaRPr lang="en-US"/>
@@ -1739,7 +1751,8 @@
           <a:p>
             <a:fld id="{BA7ADF44-F693-C841-9EBB-954F27654D1F}" type="datetimeFigureOut">
               <a:rPr lang="en-US" smtClean="0"/>
-              <a:t>6/3/14</a:t>
+              <a:pPr/>
+              <a:t>6/4/14</a:t>
             </a:fld>
             <a:endParaRPr lang="en-US"/>
           </a:p>
@@ -1781,6 +1794,7 @@
           <a:p>
             <a:fld id="{12DAF1D1-98A2-F94A-B1C7-63D8AC0F5DFC}" type="slidenum">
               <a:rPr lang="en-US" smtClean="0"/>
+              <a:pPr/>
               <a:t>‹#›</a:t>
             </a:fld>
             <a:endParaRPr lang="en-US"/>
@@ -1852,7 +1866,8 @@
           <a:p>
             <a:fld id="{BA7ADF44-F693-C841-9EBB-954F27654D1F}" type="datetimeFigureOut">
               <a:rPr lang="en-US" smtClean="0"/>
-              <a:t>6/3/14</a:t>
+              <a:pPr/>
+              <a:t>6/4/14</a:t>
             </a:fld>
             <a:endParaRPr lang="en-US"/>
           </a:p>
@@ -1894,6 +1909,7 @@
           <a:p>
             <a:fld id="{12DAF1D1-98A2-F94A-B1C7-63D8AC0F5DFC}" type="slidenum">
               <a:rPr lang="en-US" smtClean="0"/>
+              <a:pPr/>
               <a:t>‹#›</a:t>
             </a:fld>
             <a:endParaRPr lang="en-US"/>
@@ -1942,7 +1958,8 @@
           <a:p>
             <a:fld id="{BA7ADF44-F693-C841-9EBB-954F27654D1F}" type="datetimeFigureOut">
               <a:rPr lang="en-US" smtClean="0"/>
-              <a:t>6/3/14</a:t>
+              <a:pPr/>
+              <a:t>6/4/14</a:t>
             </a:fld>
             <a:endParaRPr lang="en-US"/>
           </a:p>
@@ -1984,6 +2001,7 @@
           <a:p>
             <a:fld id="{12DAF1D1-98A2-F94A-B1C7-63D8AC0F5DFC}" type="slidenum">
               <a:rPr lang="en-US" smtClean="0"/>
+              <a:pPr/>
               <a:t>‹#›</a:t>
             </a:fld>
             <a:endParaRPr lang="en-US"/>
@@ -2214,7 +2232,8 @@
           <a:p>
             <a:fld id="{BA7ADF44-F693-C841-9EBB-954F27654D1F}" type="datetimeFigureOut">
               <a:rPr lang="en-US" smtClean="0"/>
-              <a:t>6/3/14</a:t>
+              <a:pPr/>
+              <a:t>6/4/14</a:t>
             </a:fld>
             <a:endParaRPr lang="en-US"/>
           </a:p>
@@ -2256,6 +2275,7 @@
           <a:p>
             <a:fld id="{12DAF1D1-98A2-F94A-B1C7-63D8AC0F5DFC}" type="slidenum">
               <a:rPr lang="en-US" smtClean="0"/>
+              <a:pPr/>
               <a:t>‹#›</a:t>
             </a:fld>
             <a:endParaRPr lang="en-US"/>
@@ -2462,7 +2482,8 @@
           <a:p>
             <a:fld id="{BA7ADF44-F693-C841-9EBB-954F27654D1F}" type="datetimeFigureOut">
               <a:rPr lang="en-US" smtClean="0"/>
-              <a:t>6/3/14</a:t>
+              <a:pPr/>
+              <a:t>6/4/14</a:t>
             </a:fld>
             <a:endParaRPr lang="en-US"/>
           </a:p>
@@ -2504,6 +2525,7 @@
           <a:p>
             <a:fld id="{12DAF1D1-98A2-F94A-B1C7-63D8AC0F5DFC}" type="slidenum">
               <a:rPr lang="en-US" smtClean="0"/>
+              <a:pPr/>
               <a:t>‹#›</a:t>
             </a:fld>
             <a:endParaRPr lang="en-US"/>
@@ -2670,7 +2692,8 @@
           <a:p>
             <a:fld id="{BA7ADF44-F693-C841-9EBB-954F27654D1F}" type="datetimeFigureOut">
               <a:rPr lang="en-US" smtClean="0"/>
-              <a:t>6/3/14</a:t>
+              <a:pPr/>
+              <a:t>6/4/14</a:t>
             </a:fld>
             <a:endParaRPr lang="en-US"/>
           </a:p>
@@ -2748,6 +2771,7 @@
           <a:p>
             <a:fld id="{12DAF1D1-98A2-F94A-B1C7-63D8AC0F5DFC}" type="slidenum">
               <a:rPr lang="en-US" smtClean="0"/>
+              <a:pPr/>
               <a:t>‹#›</a:t>
             </a:fld>
             <a:endParaRPr lang="en-US"/>
@@ -3113,16 +3137,16 @@
       </p:grpSp>
       <p:grpSp>
         <p:nvGrpSpPr>
-          <p:cNvPr id="7" name="Group 6"/>
+          <p:cNvPr id="81" name="Group 80"/>
           <p:cNvGrpSpPr/>
           <p:nvPr/>
         </p:nvGrpSpPr>
         <p:grpSpPr>
           <a:xfrm>
             <a:off x="237389" y="4480150"/>
-            <a:ext cx="6272463" cy="4838315"/>
-            <a:chOff x="641121" y="3579842"/>
-            <a:chExt cx="4367012" cy="3368531"/>
+            <a:ext cx="6162828" cy="4838315"/>
+            <a:chOff x="237389" y="4480150"/>
+            <a:chExt cx="6162828" cy="4838315"/>
           </a:xfrm>
         </p:grpSpPr>
         <p:pic>
@@ -3153,8 +3177,8 @@
           </mc:AlternateContent>
           <p:spPr>
             <a:xfrm>
-              <a:off x="1577752" y="4006252"/>
-              <a:ext cx="3188982" cy="2543312"/>
+              <a:off x="1666348" y="5092614"/>
+              <a:ext cx="4733869" cy="3825739"/>
             </a:xfrm>
             <a:prstGeom prst="rect">
               <a:avLst/>
@@ -3169,8 +3193,8 @@
           </p:nvSpPr>
           <p:spPr>
             <a:xfrm>
-              <a:off x="641121" y="3579842"/>
-              <a:ext cx="314058" cy="321420"/>
+              <a:off x="237389" y="4480150"/>
+              <a:ext cx="451090" cy="461665"/>
             </a:xfrm>
             <a:prstGeom prst="rect">
               <a:avLst/>
@@ -3194,197 +3218,28 @@
         </p:sp>
         <p:grpSp>
           <p:nvGrpSpPr>
-            <p:cNvPr id="10" name="Group 116"/>
+            <p:cNvPr id="79" name="Group 78"/>
             <p:cNvGrpSpPr/>
             <p:nvPr/>
           </p:nvGrpSpPr>
           <p:grpSpPr>
             <a:xfrm>
-              <a:off x="1064079" y="3906832"/>
-              <a:ext cx="585180" cy="1183045"/>
-              <a:chOff x="1064079" y="3680676"/>
-              <a:chExt cx="585180" cy="1183045"/>
+              <a:off x="767990" y="5286374"/>
+              <a:ext cx="400112" cy="3539247"/>
+              <a:chOff x="767990" y="5286374"/>
+              <a:chExt cx="400112" cy="3539247"/>
             </a:xfrm>
           </p:grpSpPr>
           <p:sp>
             <p:nvSpPr>
-              <p:cNvPr id="41" name="TextBox 40"/>
+              <p:cNvPr id="11" name="TextBox 10"/>
               <p:cNvSpPr txBox="1"/>
               <p:nvPr/>
             </p:nvSpPr>
             <p:spPr>
-              <a:xfrm>
-                <a:off x="1064079" y="3680676"/>
-                <a:ext cx="585180" cy="192852"/>
-              </a:xfrm>
-              <a:prstGeom prst="rect">
-                <a:avLst/>
-              </a:prstGeom>
-              <a:noFill/>
-            </p:spPr>
-            <p:txBody>
-              <a:bodyPr wrap="square" rtlCol="0">
-                <a:spAutoFit/>
-              </a:bodyPr>
-              <a:lstStyle/>
-              <a:p>
-                <a:pPr algn="r"/>
-                <a:r>
-                  <a:rPr lang="en-US" sz="1200" dirty="0" smtClean="0"/>
-                  <a:t>1.0</a:t>
-                </a:r>
-                <a:endParaRPr lang="en-US" sz="1200" dirty="0"/>
-              </a:p>
-            </p:txBody>
-          </p:sp>
-          <p:sp>
-            <p:nvSpPr>
-              <p:cNvPr id="42" name="TextBox 41"/>
-              <p:cNvSpPr txBox="1"/>
-              <p:nvPr/>
-            </p:nvSpPr>
-            <p:spPr>
-              <a:xfrm>
-                <a:off x="1149804" y="4159858"/>
-                <a:ext cx="499455" cy="192852"/>
-              </a:xfrm>
-              <a:prstGeom prst="rect">
-                <a:avLst/>
-              </a:prstGeom>
-              <a:noFill/>
-            </p:spPr>
-            <p:txBody>
-              <a:bodyPr wrap="square" rtlCol="0">
-                <a:spAutoFit/>
-              </a:bodyPr>
-              <a:lstStyle/>
-              <a:p>
-                <a:pPr algn="r"/>
-                <a:r>
-                  <a:rPr lang="en-US" sz="1200" dirty="0" smtClean="0"/>
-                  <a:t>0.5</a:t>
-                </a:r>
-                <a:endParaRPr lang="en-US" sz="1200" dirty="0"/>
-              </a:p>
-            </p:txBody>
-          </p:sp>
-          <p:sp>
-            <p:nvSpPr>
-              <p:cNvPr id="43" name="TextBox 42"/>
-              <p:cNvSpPr txBox="1"/>
-              <p:nvPr/>
-            </p:nvSpPr>
-            <p:spPr>
-              <a:xfrm>
-                <a:off x="1149803" y="4670869"/>
-                <a:ext cx="499455" cy="192852"/>
-              </a:xfrm>
-              <a:prstGeom prst="rect">
-                <a:avLst/>
-              </a:prstGeom>
-              <a:noFill/>
-            </p:spPr>
-            <p:txBody>
-              <a:bodyPr wrap="square" rtlCol="0">
-                <a:spAutoFit/>
-              </a:bodyPr>
-              <a:lstStyle/>
-              <a:p>
-                <a:pPr algn="r"/>
-                <a:r>
-                  <a:rPr lang="en-US" sz="1200" dirty="0" smtClean="0"/>
-                  <a:t>0.0</a:t>
-                </a:r>
-                <a:endParaRPr lang="en-US" sz="1200" dirty="0"/>
-              </a:p>
-            </p:txBody>
-          </p:sp>
-        </p:grpSp>
-        <p:sp>
-          <p:nvSpPr>
-            <p:cNvPr id="11" name="TextBox 10"/>
-            <p:cNvSpPr txBox="1"/>
-            <p:nvPr/>
-          </p:nvSpPr>
-          <p:spPr>
-            <a:xfrm rot="16200000">
-              <a:off x="647114" y="4395747"/>
-              <a:ext cx="1005403" cy="278564"/>
-            </a:xfrm>
-            <a:prstGeom prst="rect">
-              <a:avLst/>
-            </a:prstGeom>
-            <a:noFill/>
-          </p:spPr>
-          <p:txBody>
-            <a:bodyPr wrap="square" rtlCol="0">
-              <a:spAutoFit/>
-            </a:bodyPr>
-            <a:lstStyle/>
-            <a:p>
-              <a:pPr algn="ctr"/>
-              <a:r>
-                <a:rPr lang="en-GB" sz="2000" b="1" dirty="0" smtClean="0"/>
-                <a:t>% accuracy</a:t>
-              </a:r>
-              <a:endParaRPr lang="en-US" sz="2000" b="1" baseline="-25000" dirty="0"/>
-            </a:p>
-          </p:txBody>
-        </p:sp>
-        <p:grpSp>
-          <p:nvGrpSpPr>
-            <p:cNvPr id="12" name="Group 99"/>
-            <p:cNvGrpSpPr/>
-            <p:nvPr/>
-          </p:nvGrpSpPr>
-          <p:grpSpPr>
-            <a:xfrm>
-              <a:off x="1511428" y="6423618"/>
-              <a:ext cx="1544422" cy="214280"/>
-              <a:chOff x="1511428" y="6323408"/>
-              <a:chExt cx="1544422" cy="214280"/>
-            </a:xfrm>
-          </p:grpSpPr>
-          <p:sp>
-            <p:nvSpPr>
-              <p:cNvPr id="37" name="TextBox 36"/>
-              <p:cNvSpPr txBox="1"/>
-              <p:nvPr/>
-            </p:nvSpPr>
-            <p:spPr>
-              <a:xfrm>
-                <a:off x="1860056" y="6323408"/>
-                <a:ext cx="275661" cy="214280"/>
-              </a:xfrm>
-              <a:prstGeom prst="rect">
-                <a:avLst/>
-              </a:prstGeom>
-              <a:noFill/>
-            </p:spPr>
-            <p:txBody>
-              <a:bodyPr wrap="square" rtlCol="0">
-                <a:spAutoFit/>
-              </a:bodyPr>
-              <a:lstStyle/>
-              <a:p>
-                <a:r>
-                  <a:rPr lang="en-GB" sz="1400" dirty="0" smtClean="0"/>
-                  <a:t>5</a:t>
-                </a:r>
-                <a:endParaRPr lang="en-US" sz="1400" baseline="-25000" dirty="0"/>
-              </a:p>
-            </p:txBody>
-          </p:sp>
-          <p:sp>
-            <p:nvSpPr>
-              <p:cNvPr id="38" name="TextBox 37"/>
-              <p:cNvSpPr txBox="1"/>
-              <p:nvPr/>
-            </p:nvSpPr>
-            <p:spPr>
-              <a:xfrm>
-                <a:off x="2254139" y="6323408"/>
-                <a:ext cx="366657" cy="214280"/>
+              <a:xfrm rot="16200000">
+                <a:off x="264784" y="5789582"/>
+                <a:ext cx="1406525" cy="400110"/>
               </a:xfrm>
               <a:prstGeom prst="rect">
                 <a:avLst/>
@@ -3399,23 +3254,23 @@
               <a:p>
                 <a:pPr algn="ctr"/>
                 <a:r>
-                  <a:rPr lang="en-GB" sz="1400" dirty="0" smtClean="0"/>
-                  <a:t>10</a:t>
+                  <a:rPr lang="en-GB" sz="2000" b="1" dirty="0" smtClean="0"/>
+                  <a:t>% accuracy</a:t>
                 </a:r>
-                <a:endParaRPr lang="en-US" sz="1400" baseline="-25000" dirty="0"/>
+                <a:endParaRPr lang="en-US" sz="2000" b="1" baseline="-25000" dirty="0"/>
               </a:p>
             </p:txBody>
           </p:sp>
           <p:sp>
             <p:nvSpPr>
-              <p:cNvPr id="39" name="TextBox 38"/>
+              <p:cNvPr id="16" name="TextBox 15"/>
               <p:cNvSpPr txBox="1"/>
               <p:nvPr/>
             </p:nvSpPr>
             <p:spPr>
-              <a:xfrm>
-                <a:off x="2689193" y="6323408"/>
-                <a:ext cx="366657" cy="214280"/>
+              <a:xfrm rot="16200000">
+                <a:off x="-14877" y="7642645"/>
+                <a:ext cx="1965843" cy="400109"/>
               </a:xfrm>
               <a:prstGeom prst="rect">
                 <a:avLst/>
@@ -3430,23 +3285,38 @@
               <a:p>
                 <a:pPr algn="ctr"/>
                 <a:r>
-                  <a:rPr lang="en-GB" sz="1400" dirty="0" smtClean="0"/>
-                  <a:t>15</a:t>
+                  <a:rPr lang="en-GB" sz="2000" b="1" dirty="0" smtClean="0"/>
+                  <a:t>% choose target</a:t>
                 </a:r>
-                <a:endParaRPr lang="en-US" sz="1400" baseline="-25000" dirty="0"/>
+                <a:endParaRPr lang="en-US" sz="2000" b="1" baseline="-25000" dirty="0"/>
               </a:p>
             </p:txBody>
           </p:sp>
+        </p:grpSp>
+        <p:grpSp>
+          <p:nvGrpSpPr>
+            <p:cNvPr id="68" name="Group 67"/>
+            <p:cNvGrpSpPr/>
+            <p:nvPr/>
+          </p:nvGrpSpPr>
+          <p:grpSpPr>
+            <a:xfrm>
+              <a:off x="1952630" y="8918354"/>
+              <a:ext cx="4376531" cy="400111"/>
+              <a:chOff x="1685406" y="8918354"/>
+              <a:chExt cx="4376531" cy="400111"/>
+            </a:xfrm>
+          </p:grpSpPr>
           <p:sp>
             <p:nvSpPr>
-              <p:cNvPr id="40" name="TextBox 39"/>
+              <p:cNvPr id="18" name="TextBox 17"/>
               <p:cNvSpPr txBox="1"/>
               <p:nvPr/>
             </p:nvSpPr>
             <p:spPr>
               <a:xfrm>
-                <a:off x="1511428" y="6323408"/>
-                <a:ext cx="275661" cy="214280"/>
+                <a:off x="1685406" y="8918354"/>
+                <a:ext cx="1893523" cy="400111"/>
               </a:xfrm>
               <a:prstGeom prst="rect">
                 <a:avLst/>
@@ -3454,44 +3324,30 @@
               <a:noFill/>
             </p:spPr>
             <p:txBody>
-              <a:bodyPr wrap="square" rtlCol="0">
+              <a:bodyPr wrap="square" rtlCol="0" anchor="ctr">
                 <a:spAutoFit/>
               </a:bodyPr>
               <a:lstStyle/>
               <a:p>
+                <a:pPr algn="ctr"/>
                 <a:r>
-                  <a:rPr lang="en-GB" sz="1400" dirty="0" smtClean="0"/>
-                  <a:t>1</a:t>
+                  <a:rPr lang="en-GB" sz="2000" b="1" dirty="0" smtClean="0"/>
+                  <a:t>trial</a:t>
                 </a:r>
-                <a:endParaRPr lang="en-US" sz="1400" baseline="-25000" dirty="0"/>
+                <a:endParaRPr lang="en-US" sz="2000" b="1" baseline="-25000" dirty="0"/>
               </a:p>
             </p:txBody>
           </p:sp>
-        </p:grpSp>
-        <p:grpSp>
-          <p:nvGrpSpPr>
-            <p:cNvPr id="13" name="Group 100"/>
-            <p:cNvGrpSpPr/>
-            <p:nvPr/>
-          </p:nvGrpSpPr>
-          <p:grpSpPr>
-            <a:xfrm>
-              <a:off x="3236318" y="6423618"/>
-              <a:ext cx="1544422" cy="214280"/>
-              <a:chOff x="1511428" y="6323408"/>
-              <a:chExt cx="1544422" cy="214280"/>
-            </a:xfrm>
-          </p:grpSpPr>
           <p:sp>
             <p:nvSpPr>
-              <p:cNvPr id="33" name="TextBox 32"/>
+              <p:cNvPr id="19" name="TextBox 18"/>
               <p:cNvSpPr txBox="1"/>
               <p:nvPr/>
             </p:nvSpPr>
             <p:spPr>
               <a:xfrm>
-                <a:off x="1860056" y="6323408"/>
-                <a:ext cx="275661" cy="214280"/>
+                <a:off x="4168414" y="8918354"/>
+                <a:ext cx="1893523" cy="400111"/>
               </a:xfrm>
               <a:prstGeom prst="rect">
                 <a:avLst/>
@@ -3499,29 +3355,45 @@
               <a:noFill/>
             </p:spPr>
             <p:txBody>
-              <a:bodyPr wrap="square" rtlCol="0">
+              <a:bodyPr wrap="square" rtlCol="0" anchor="ctr">
                 <a:spAutoFit/>
               </a:bodyPr>
               <a:lstStyle/>
               <a:p>
+                <a:pPr algn="ctr"/>
                 <a:r>
-                  <a:rPr lang="en-GB" sz="1400" dirty="0" smtClean="0"/>
-                  <a:t>5</a:t>
+                  <a:rPr lang="en-GB" sz="2000" b="1" dirty="0" smtClean="0"/>
+                  <a:t>trial</a:t>
                 </a:r>
-                <a:endParaRPr lang="en-US" sz="1400" baseline="-25000" dirty="0"/>
+                <a:endParaRPr lang="en-US" sz="2000" b="1" baseline="-25000" dirty="0"/>
               </a:p>
             </p:txBody>
           </p:sp>
+        </p:grpSp>
+        <p:grpSp>
+          <p:nvGrpSpPr>
+            <p:cNvPr id="77" name="Group 76"/>
+            <p:cNvGrpSpPr/>
+            <p:nvPr/>
+          </p:nvGrpSpPr>
+          <p:grpSpPr>
+            <a:xfrm>
+              <a:off x="2038874" y="4710984"/>
+              <a:ext cx="4184650" cy="477667"/>
+              <a:chOff x="1771650" y="4710984"/>
+              <a:chExt cx="4184650" cy="477667"/>
+            </a:xfrm>
+          </p:grpSpPr>
           <p:sp>
             <p:nvSpPr>
-              <p:cNvPr id="34" name="TextBox 33"/>
+              <p:cNvPr id="20" name="TextBox 19"/>
               <p:cNvSpPr txBox="1"/>
               <p:nvPr/>
             </p:nvSpPr>
             <p:spPr>
               <a:xfrm>
-                <a:off x="2254139" y="6323408"/>
-                <a:ext cx="366657" cy="214280"/>
+                <a:off x="4155714" y="4710984"/>
+                <a:ext cx="1800586" cy="477667"/>
               </a:xfrm>
               <a:prstGeom prst="rect">
                 <a:avLst/>
@@ -3529,30 +3401,38 @@
               <a:noFill/>
             </p:spPr>
             <p:txBody>
-              <a:bodyPr wrap="square" rtlCol="0">
+              <a:bodyPr wrap="square" lIns="107287" tIns="53643" rIns="107287" bIns="53643" rtlCol="0" anchor="ctr">
                 <a:spAutoFit/>
               </a:bodyPr>
               <a:lstStyle/>
               <a:p>
                 <a:pPr algn="ctr"/>
                 <a:r>
-                  <a:rPr lang="en-GB" sz="1400" dirty="0" smtClean="0"/>
-                  <a:t>10</a:t>
+                  <a:rPr lang="en-US" sz="2400" dirty="0" smtClean="0">
+                    <a:solidFill>
+                      <a:srgbClr val="00FF00"/>
+                    </a:solidFill>
+                  </a:rPr>
+                  <a:t>Novel</a:t>
                 </a:r>
-                <a:endParaRPr lang="en-US" sz="1400" baseline="-25000" dirty="0"/>
+                <a:endParaRPr lang="en-US" sz="2400" dirty="0">
+                  <a:solidFill>
+                    <a:srgbClr val="00FF00"/>
+                  </a:solidFill>
+                </a:endParaRPr>
               </a:p>
             </p:txBody>
           </p:sp>
           <p:sp>
             <p:nvSpPr>
-              <p:cNvPr id="35" name="TextBox 34"/>
+              <p:cNvPr id="21" name="TextBox 20"/>
               <p:cNvSpPr txBox="1"/>
               <p:nvPr/>
             </p:nvSpPr>
             <p:spPr>
               <a:xfrm>
-                <a:off x="2689193" y="6323408"/>
-                <a:ext cx="366657" cy="214280"/>
+                <a:off x="1771650" y="4710984"/>
+                <a:ext cx="1807279" cy="477667"/>
               </a:xfrm>
               <a:prstGeom prst="rect">
                 <a:avLst/>
@@ -3560,604 +3440,893 @@
               <a:noFill/>
             </p:spPr>
             <p:txBody>
-              <a:bodyPr wrap="square" rtlCol="0">
+              <a:bodyPr wrap="square" lIns="107287" tIns="53643" rIns="107287" bIns="53643" rtlCol="0" anchor="ctr">
                 <a:spAutoFit/>
               </a:bodyPr>
               <a:lstStyle/>
               <a:p>
                 <a:pPr algn="ctr"/>
                 <a:r>
-                  <a:rPr lang="en-GB" sz="1400" dirty="0" smtClean="0"/>
-                  <a:t>15</a:t>
+                  <a:rPr lang="en-US" sz="2400" dirty="0" smtClean="0">
+                    <a:solidFill>
+                      <a:srgbClr val="FF0000"/>
+                    </a:solidFill>
+                  </a:rPr>
+                  <a:t>Familiar</a:t>
                 </a:r>
-                <a:endParaRPr lang="en-US" sz="1400" baseline="-25000" dirty="0"/>
-              </a:p>
-            </p:txBody>
-          </p:sp>
-          <p:sp>
-            <p:nvSpPr>
-              <p:cNvPr id="36" name="TextBox 35"/>
-              <p:cNvSpPr txBox="1"/>
-              <p:nvPr/>
-            </p:nvSpPr>
-            <p:spPr>
-              <a:xfrm>
-                <a:off x="1511428" y="6323408"/>
-                <a:ext cx="275661" cy="214280"/>
-              </a:xfrm>
-              <a:prstGeom prst="rect">
-                <a:avLst/>
-              </a:prstGeom>
-              <a:noFill/>
-            </p:spPr>
-            <p:txBody>
-              <a:bodyPr wrap="square" rtlCol="0">
-                <a:spAutoFit/>
-              </a:bodyPr>
-              <a:lstStyle/>
-              <a:p>
-                <a:r>
-                  <a:rPr lang="en-GB" sz="1400" dirty="0" smtClean="0"/>
-                  <a:t>1</a:t>
-                </a:r>
-                <a:endParaRPr lang="en-US" sz="1400" baseline="-25000" dirty="0"/>
+                <a:endParaRPr lang="en-US" sz="2400" dirty="0">
+                  <a:solidFill>
+                    <a:srgbClr val="FF0000"/>
+                  </a:solidFill>
+                </a:endParaRPr>
               </a:p>
             </p:txBody>
           </p:sp>
         </p:grpSp>
         <p:grpSp>
           <p:nvGrpSpPr>
-            <p:cNvPr id="14" name="Group 105"/>
+            <p:cNvPr id="67" name="Group 66"/>
             <p:cNvGrpSpPr/>
             <p:nvPr/>
           </p:nvGrpSpPr>
           <p:grpSpPr>
             <a:xfrm>
-              <a:off x="1511428" y="5029660"/>
-              <a:ext cx="1544422" cy="214280"/>
-              <a:chOff x="1511428" y="6323408"/>
-              <a:chExt cx="1544422" cy="214280"/>
+              <a:off x="1837210" y="6622524"/>
+              <a:ext cx="4531257" cy="2295829"/>
+              <a:chOff x="1569986" y="6622524"/>
+              <a:chExt cx="4531257" cy="2295829"/>
             </a:xfrm>
           </p:grpSpPr>
-          <p:sp>
-            <p:nvSpPr>
-              <p:cNvPr id="29" name="TextBox 28"/>
-              <p:cNvSpPr txBox="1"/>
+          <p:grpSp>
+            <p:nvGrpSpPr>
+              <p:cNvPr id="14" name="Group 105"/>
+              <p:cNvGrpSpPr/>
               <p:nvPr/>
-            </p:nvSpPr>
-            <p:spPr>
+            </p:nvGrpSpPr>
+            <p:grpSpPr>
               <a:xfrm>
-                <a:off x="1860056" y="6323408"/>
-                <a:ext cx="275661" cy="214280"/>
+                <a:off x="3952790" y="8549001"/>
+                <a:ext cx="2148453" cy="369352"/>
+                <a:chOff x="1522478" y="6323395"/>
+                <a:chExt cx="1495794" cy="257150"/>
               </a:xfrm>
-              <a:prstGeom prst="rect">
-                <a:avLst/>
-              </a:prstGeom>
-              <a:noFill/>
-            </p:spPr>
-            <p:txBody>
-              <a:bodyPr wrap="square" rtlCol="0">
-                <a:spAutoFit/>
-              </a:bodyPr>
-              <a:lstStyle/>
-              <a:p>
-                <a:r>
-                  <a:rPr lang="en-GB" sz="1400" dirty="0" smtClean="0"/>
-                  <a:t>5</a:t>
-                </a:r>
-                <a:endParaRPr lang="en-US" sz="1400" baseline="-25000" dirty="0"/>
-              </a:p>
-            </p:txBody>
-          </p:sp>
-          <p:sp>
-            <p:nvSpPr>
-              <p:cNvPr id="30" name="TextBox 29"/>
-              <p:cNvSpPr txBox="1"/>
+            </p:grpSpPr>
+            <p:sp>
+              <p:nvSpPr>
+                <p:cNvPr id="29" name="TextBox 28"/>
+                <p:cNvSpPr txBox="1"/>
+                <p:nvPr/>
+              </p:nvSpPr>
+              <p:spPr>
+                <a:xfrm>
+                  <a:off x="1857845" y="6323408"/>
+                  <a:ext cx="275661" cy="257137"/>
+                </a:xfrm>
+                <a:prstGeom prst="rect">
+                  <a:avLst/>
+                </a:prstGeom>
+                <a:noFill/>
+              </p:spPr>
+              <p:txBody>
+                <a:bodyPr wrap="square" rtlCol="0">
+                  <a:spAutoFit/>
+                </a:bodyPr>
+                <a:lstStyle/>
+                <a:p>
+                  <a:pPr algn="ctr"/>
+                  <a:r>
+                    <a:rPr lang="en-GB" dirty="0" smtClean="0"/>
+                    <a:t>5</a:t>
+                  </a:r>
+                  <a:endParaRPr lang="en-US" baseline="-25000" dirty="0"/>
+                </a:p>
+              </p:txBody>
+            </p:sp>
+            <p:sp>
+              <p:nvSpPr>
+                <p:cNvPr id="30" name="TextBox 29"/>
+                <p:cNvSpPr txBox="1"/>
+                <p:nvPr/>
+              </p:nvSpPr>
+              <p:spPr>
+                <a:xfrm>
+                  <a:off x="2232034" y="6323402"/>
+                  <a:ext cx="366657" cy="257136"/>
+                </a:xfrm>
+                <a:prstGeom prst="rect">
+                  <a:avLst/>
+                </a:prstGeom>
+                <a:noFill/>
+              </p:spPr>
+              <p:txBody>
+                <a:bodyPr wrap="square" rtlCol="0">
+                  <a:spAutoFit/>
+                </a:bodyPr>
+                <a:lstStyle/>
+                <a:p>
+                  <a:pPr algn="ctr"/>
+                  <a:r>
+                    <a:rPr lang="en-GB" dirty="0" smtClean="0"/>
+                    <a:t>10</a:t>
+                  </a:r>
+                  <a:endParaRPr lang="en-US" baseline="-25000" dirty="0"/>
+                </a:p>
+              </p:txBody>
+            </p:sp>
+            <p:sp>
+              <p:nvSpPr>
+                <p:cNvPr id="31" name="TextBox 30"/>
+                <p:cNvSpPr txBox="1"/>
+                <p:nvPr/>
+              </p:nvSpPr>
+              <p:spPr>
+                <a:xfrm>
+                  <a:off x="2651615" y="6323395"/>
+                  <a:ext cx="366657" cy="257136"/>
+                </a:xfrm>
+                <a:prstGeom prst="rect">
+                  <a:avLst/>
+                </a:prstGeom>
+                <a:noFill/>
+              </p:spPr>
+              <p:txBody>
+                <a:bodyPr wrap="square" rtlCol="0">
+                  <a:spAutoFit/>
+                </a:bodyPr>
+                <a:lstStyle/>
+                <a:p>
+                  <a:pPr algn="ctr"/>
+                  <a:r>
+                    <a:rPr lang="en-GB" dirty="0" smtClean="0"/>
+                    <a:t>15</a:t>
+                  </a:r>
+                  <a:endParaRPr lang="en-US" baseline="-25000" dirty="0"/>
+                </a:p>
+              </p:txBody>
+            </p:sp>
+            <p:sp>
+              <p:nvSpPr>
+                <p:cNvPr id="32" name="TextBox 31"/>
+                <p:cNvSpPr txBox="1"/>
+                <p:nvPr/>
+              </p:nvSpPr>
+              <p:spPr>
+                <a:xfrm>
+                  <a:off x="1522478" y="6323396"/>
+                  <a:ext cx="275661" cy="257136"/>
+                </a:xfrm>
+                <a:prstGeom prst="rect">
+                  <a:avLst/>
+                </a:prstGeom>
+                <a:noFill/>
+              </p:spPr>
+              <p:txBody>
+                <a:bodyPr wrap="square" rtlCol="0">
+                  <a:spAutoFit/>
+                </a:bodyPr>
+                <a:lstStyle/>
+                <a:p>
+                  <a:pPr algn="ctr"/>
+                  <a:r>
+                    <a:rPr lang="en-GB" dirty="0" smtClean="0"/>
+                    <a:t>1</a:t>
+                  </a:r>
+                  <a:endParaRPr lang="en-US" baseline="-25000" dirty="0"/>
+                </a:p>
+              </p:txBody>
+            </p:sp>
+          </p:grpSp>
+          <p:grpSp>
+            <p:nvGrpSpPr>
+              <p:cNvPr id="52" name="Group 105"/>
+              <p:cNvGrpSpPr/>
               <p:nvPr/>
-            </p:nvSpPr>
-            <p:spPr>
+            </p:nvGrpSpPr>
+            <p:grpSpPr>
               <a:xfrm>
-                <a:off x="2254139" y="6323408"/>
-                <a:ext cx="366657" cy="214280"/>
+                <a:off x="1569986" y="8549001"/>
+                <a:ext cx="2148453" cy="369352"/>
+                <a:chOff x="1522478" y="6323395"/>
+                <a:chExt cx="1495794" cy="257150"/>
               </a:xfrm>
-              <a:prstGeom prst="rect">
-                <a:avLst/>
-              </a:prstGeom>
-              <a:noFill/>
-            </p:spPr>
-            <p:txBody>
-              <a:bodyPr wrap="square" rtlCol="0">
-                <a:spAutoFit/>
-              </a:bodyPr>
-              <a:lstStyle/>
-              <a:p>
-                <a:pPr algn="ctr"/>
-                <a:r>
-                  <a:rPr lang="en-GB" sz="1400" dirty="0" smtClean="0"/>
-                  <a:t>10</a:t>
-                </a:r>
-                <a:endParaRPr lang="en-US" sz="1400" baseline="-25000" dirty="0"/>
-              </a:p>
-            </p:txBody>
-          </p:sp>
-          <p:sp>
-            <p:nvSpPr>
-              <p:cNvPr id="31" name="TextBox 30"/>
-              <p:cNvSpPr txBox="1"/>
+            </p:grpSpPr>
+            <p:sp>
+              <p:nvSpPr>
+                <p:cNvPr id="53" name="TextBox 52"/>
+                <p:cNvSpPr txBox="1"/>
+                <p:nvPr/>
+              </p:nvSpPr>
+              <p:spPr>
+                <a:xfrm>
+                  <a:off x="1857845" y="6323408"/>
+                  <a:ext cx="275661" cy="257137"/>
+                </a:xfrm>
+                <a:prstGeom prst="rect">
+                  <a:avLst/>
+                </a:prstGeom>
+                <a:noFill/>
+              </p:spPr>
+              <p:txBody>
+                <a:bodyPr wrap="square" rtlCol="0">
+                  <a:spAutoFit/>
+                </a:bodyPr>
+                <a:lstStyle/>
+                <a:p>
+                  <a:pPr algn="ctr"/>
+                  <a:r>
+                    <a:rPr lang="en-GB" dirty="0" smtClean="0"/>
+                    <a:t>5</a:t>
+                  </a:r>
+                  <a:endParaRPr lang="en-US" baseline="-25000" dirty="0"/>
+                </a:p>
+              </p:txBody>
+            </p:sp>
+            <p:sp>
+              <p:nvSpPr>
+                <p:cNvPr id="54" name="TextBox 53"/>
+                <p:cNvSpPr txBox="1"/>
+                <p:nvPr/>
+              </p:nvSpPr>
+              <p:spPr>
+                <a:xfrm>
+                  <a:off x="2232034" y="6323402"/>
+                  <a:ext cx="366657" cy="257136"/>
+                </a:xfrm>
+                <a:prstGeom prst="rect">
+                  <a:avLst/>
+                </a:prstGeom>
+                <a:noFill/>
+              </p:spPr>
+              <p:txBody>
+                <a:bodyPr wrap="square" rtlCol="0">
+                  <a:spAutoFit/>
+                </a:bodyPr>
+                <a:lstStyle/>
+                <a:p>
+                  <a:pPr algn="ctr"/>
+                  <a:r>
+                    <a:rPr lang="en-GB" dirty="0" smtClean="0"/>
+                    <a:t>10</a:t>
+                  </a:r>
+                  <a:endParaRPr lang="en-US" baseline="-25000" dirty="0"/>
+                </a:p>
+              </p:txBody>
+            </p:sp>
+            <p:sp>
+              <p:nvSpPr>
+                <p:cNvPr id="55" name="TextBox 54"/>
+                <p:cNvSpPr txBox="1"/>
+                <p:nvPr/>
+              </p:nvSpPr>
+              <p:spPr>
+                <a:xfrm>
+                  <a:off x="2651615" y="6323395"/>
+                  <a:ext cx="366657" cy="257136"/>
+                </a:xfrm>
+                <a:prstGeom prst="rect">
+                  <a:avLst/>
+                </a:prstGeom>
+                <a:noFill/>
+              </p:spPr>
+              <p:txBody>
+                <a:bodyPr wrap="square" rtlCol="0">
+                  <a:spAutoFit/>
+                </a:bodyPr>
+                <a:lstStyle/>
+                <a:p>
+                  <a:pPr algn="ctr"/>
+                  <a:r>
+                    <a:rPr lang="en-GB" dirty="0" smtClean="0"/>
+                    <a:t>15</a:t>
+                  </a:r>
+                  <a:endParaRPr lang="en-US" baseline="-25000" dirty="0"/>
+                </a:p>
+              </p:txBody>
+            </p:sp>
+            <p:sp>
+              <p:nvSpPr>
+                <p:cNvPr id="56" name="TextBox 55"/>
+                <p:cNvSpPr txBox="1"/>
+                <p:nvPr/>
+              </p:nvSpPr>
+              <p:spPr>
+                <a:xfrm>
+                  <a:off x="1522478" y="6323396"/>
+                  <a:ext cx="275661" cy="257136"/>
+                </a:xfrm>
+                <a:prstGeom prst="rect">
+                  <a:avLst/>
+                </a:prstGeom>
+                <a:noFill/>
+              </p:spPr>
+              <p:txBody>
+                <a:bodyPr wrap="square" rtlCol="0">
+                  <a:spAutoFit/>
+                </a:bodyPr>
+                <a:lstStyle/>
+                <a:p>
+                  <a:pPr algn="ctr"/>
+                  <a:r>
+                    <a:rPr lang="en-GB" dirty="0" smtClean="0"/>
+                    <a:t>1</a:t>
+                  </a:r>
+                  <a:endParaRPr lang="en-US" baseline="-25000" dirty="0"/>
+                </a:p>
+              </p:txBody>
+            </p:sp>
+          </p:grpSp>
+          <p:grpSp>
+            <p:nvGrpSpPr>
+              <p:cNvPr id="57" name="Group 105"/>
+              <p:cNvGrpSpPr/>
               <p:nvPr/>
-            </p:nvSpPr>
-            <p:spPr>
+            </p:nvGrpSpPr>
+            <p:grpSpPr>
               <a:xfrm>
-                <a:off x="2689193" y="6323408"/>
-                <a:ext cx="366657" cy="214280"/>
+                <a:off x="3952790" y="6622524"/>
+                <a:ext cx="2148453" cy="369352"/>
+                <a:chOff x="1522478" y="6323395"/>
+                <a:chExt cx="1495794" cy="257150"/>
               </a:xfrm>
-              <a:prstGeom prst="rect">
-                <a:avLst/>
-              </a:prstGeom>
-              <a:noFill/>
-            </p:spPr>
-            <p:txBody>
-              <a:bodyPr wrap="square" rtlCol="0">
-                <a:spAutoFit/>
-              </a:bodyPr>
-              <a:lstStyle/>
-              <a:p>
-                <a:pPr algn="ctr"/>
-                <a:r>
-                  <a:rPr lang="en-GB" sz="1400" dirty="0" smtClean="0"/>
-                  <a:t>15</a:t>
-                </a:r>
-                <a:endParaRPr lang="en-US" sz="1400" baseline="-25000" dirty="0"/>
-              </a:p>
-            </p:txBody>
-          </p:sp>
-          <p:sp>
-            <p:nvSpPr>
-              <p:cNvPr id="32" name="TextBox 31"/>
-              <p:cNvSpPr txBox="1"/>
+            </p:grpSpPr>
+            <p:sp>
+              <p:nvSpPr>
+                <p:cNvPr id="58" name="TextBox 57"/>
+                <p:cNvSpPr txBox="1"/>
+                <p:nvPr/>
+              </p:nvSpPr>
+              <p:spPr>
+                <a:xfrm>
+                  <a:off x="1857845" y="6323408"/>
+                  <a:ext cx="275661" cy="257137"/>
+                </a:xfrm>
+                <a:prstGeom prst="rect">
+                  <a:avLst/>
+                </a:prstGeom>
+                <a:noFill/>
+              </p:spPr>
+              <p:txBody>
+                <a:bodyPr wrap="square" rtlCol="0">
+                  <a:spAutoFit/>
+                </a:bodyPr>
+                <a:lstStyle/>
+                <a:p>
+                  <a:pPr algn="ctr"/>
+                  <a:r>
+                    <a:rPr lang="en-GB" dirty="0" smtClean="0"/>
+                    <a:t>5</a:t>
+                  </a:r>
+                  <a:endParaRPr lang="en-US" baseline="-25000" dirty="0"/>
+                </a:p>
+              </p:txBody>
+            </p:sp>
+            <p:sp>
+              <p:nvSpPr>
+                <p:cNvPr id="59" name="TextBox 58"/>
+                <p:cNvSpPr txBox="1"/>
+                <p:nvPr/>
+              </p:nvSpPr>
+              <p:spPr>
+                <a:xfrm>
+                  <a:off x="2232034" y="6323402"/>
+                  <a:ext cx="366657" cy="257136"/>
+                </a:xfrm>
+                <a:prstGeom prst="rect">
+                  <a:avLst/>
+                </a:prstGeom>
+                <a:noFill/>
+              </p:spPr>
+              <p:txBody>
+                <a:bodyPr wrap="square" rtlCol="0">
+                  <a:spAutoFit/>
+                </a:bodyPr>
+                <a:lstStyle/>
+                <a:p>
+                  <a:pPr algn="ctr"/>
+                  <a:r>
+                    <a:rPr lang="en-GB" dirty="0" smtClean="0"/>
+                    <a:t>10</a:t>
+                  </a:r>
+                  <a:endParaRPr lang="en-US" baseline="-25000" dirty="0"/>
+                </a:p>
+              </p:txBody>
+            </p:sp>
+            <p:sp>
+              <p:nvSpPr>
+                <p:cNvPr id="60" name="TextBox 59"/>
+                <p:cNvSpPr txBox="1"/>
+                <p:nvPr/>
+              </p:nvSpPr>
+              <p:spPr>
+                <a:xfrm>
+                  <a:off x="2651615" y="6323395"/>
+                  <a:ext cx="366657" cy="257136"/>
+                </a:xfrm>
+                <a:prstGeom prst="rect">
+                  <a:avLst/>
+                </a:prstGeom>
+                <a:noFill/>
+              </p:spPr>
+              <p:txBody>
+                <a:bodyPr wrap="square" rtlCol="0">
+                  <a:spAutoFit/>
+                </a:bodyPr>
+                <a:lstStyle/>
+                <a:p>
+                  <a:pPr algn="ctr"/>
+                  <a:r>
+                    <a:rPr lang="en-GB" dirty="0" smtClean="0"/>
+                    <a:t>15</a:t>
+                  </a:r>
+                  <a:endParaRPr lang="en-US" baseline="-25000" dirty="0"/>
+                </a:p>
+              </p:txBody>
+            </p:sp>
+            <p:sp>
+              <p:nvSpPr>
+                <p:cNvPr id="61" name="TextBox 60"/>
+                <p:cNvSpPr txBox="1"/>
+                <p:nvPr/>
+              </p:nvSpPr>
+              <p:spPr>
+                <a:xfrm>
+                  <a:off x="1522478" y="6323396"/>
+                  <a:ext cx="275661" cy="257136"/>
+                </a:xfrm>
+                <a:prstGeom prst="rect">
+                  <a:avLst/>
+                </a:prstGeom>
+                <a:noFill/>
+              </p:spPr>
+              <p:txBody>
+                <a:bodyPr wrap="square" rtlCol="0">
+                  <a:spAutoFit/>
+                </a:bodyPr>
+                <a:lstStyle/>
+                <a:p>
+                  <a:pPr algn="ctr"/>
+                  <a:r>
+                    <a:rPr lang="en-GB" dirty="0" smtClean="0"/>
+                    <a:t>1</a:t>
+                  </a:r>
+                  <a:endParaRPr lang="en-US" baseline="-25000" dirty="0"/>
+                </a:p>
+              </p:txBody>
+            </p:sp>
+          </p:grpSp>
+          <p:grpSp>
+            <p:nvGrpSpPr>
+              <p:cNvPr id="62" name="Group 105"/>
+              <p:cNvGrpSpPr/>
               <p:nvPr/>
-            </p:nvSpPr>
-            <p:spPr>
+            </p:nvGrpSpPr>
+            <p:grpSpPr>
               <a:xfrm>
-                <a:off x="1511428" y="6323408"/>
-                <a:ext cx="275661" cy="214280"/>
+                <a:off x="1569986" y="6622524"/>
+                <a:ext cx="2148453" cy="369352"/>
+                <a:chOff x="1522478" y="6323395"/>
+                <a:chExt cx="1495794" cy="257150"/>
               </a:xfrm>
-              <a:prstGeom prst="rect">
-                <a:avLst/>
-              </a:prstGeom>
-              <a:noFill/>
-            </p:spPr>
-            <p:txBody>
-              <a:bodyPr wrap="square" rtlCol="0">
-                <a:spAutoFit/>
-              </a:bodyPr>
-              <a:lstStyle/>
-              <a:p>
-                <a:r>
-                  <a:rPr lang="en-GB" sz="1400" dirty="0" smtClean="0"/>
-                  <a:t>1</a:t>
-                </a:r>
-                <a:endParaRPr lang="en-US" sz="1400" baseline="-25000" dirty="0"/>
-              </a:p>
-            </p:txBody>
-          </p:sp>
+            </p:grpSpPr>
+            <p:sp>
+              <p:nvSpPr>
+                <p:cNvPr id="63" name="TextBox 62"/>
+                <p:cNvSpPr txBox="1"/>
+                <p:nvPr/>
+              </p:nvSpPr>
+              <p:spPr>
+                <a:xfrm>
+                  <a:off x="1857845" y="6323408"/>
+                  <a:ext cx="275661" cy="257137"/>
+                </a:xfrm>
+                <a:prstGeom prst="rect">
+                  <a:avLst/>
+                </a:prstGeom>
+                <a:noFill/>
+              </p:spPr>
+              <p:txBody>
+                <a:bodyPr wrap="square" rtlCol="0">
+                  <a:spAutoFit/>
+                </a:bodyPr>
+                <a:lstStyle/>
+                <a:p>
+                  <a:pPr algn="ctr"/>
+                  <a:r>
+                    <a:rPr lang="en-GB" dirty="0" smtClean="0"/>
+                    <a:t>5</a:t>
+                  </a:r>
+                  <a:endParaRPr lang="en-US" baseline="-25000" dirty="0"/>
+                </a:p>
+              </p:txBody>
+            </p:sp>
+            <p:sp>
+              <p:nvSpPr>
+                <p:cNvPr id="64" name="TextBox 63"/>
+                <p:cNvSpPr txBox="1"/>
+                <p:nvPr/>
+              </p:nvSpPr>
+              <p:spPr>
+                <a:xfrm>
+                  <a:off x="2232034" y="6323402"/>
+                  <a:ext cx="366657" cy="257136"/>
+                </a:xfrm>
+                <a:prstGeom prst="rect">
+                  <a:avLst/>
+                </a:prstGeom>
+                <a:noFill/>
+              </p:spPr>
+              <p:txBody>
+                <a:bodyPr wrap="square" rtlCol="0">
+                  <a:spAutoFit/>
+                </a:bodyPr>
+                <a:lstStyle/>
+                <a:p>
+                  <a:pPr algn="ctr"/>
+                  <a:r>
+                    <a:rPr lang="en-GB" dirty="0" smtClean="0"/>
+                    <a:t>10</a:t>
+                  </a:r>
+                  <a:endParaRPr lang="en-US" baseline="-25000" dirty="0"/>
+                </a:p>
+              </p:txBody>
+            </p:sp>
+            <p:sp>
+              <p:nvSpPr>
+                <p:cNvPr id="65" name="TextBox 64"/>
+                <p:cNvSpPr txBox="1"/>
+                <p:nvPr/>
+              </p:nvSpPr>
+              <p:spPr>
+                <a:xfrm>
+                  <a:off x="2651615" y="6323395"/>
+                  <a:ext cx="366657" cy="257136"/>
+                </a:xfrm>
+                <a:prstGeom prst="rect">
+                  <a:avLst/>
+                </a:prstGeom>
+                <a:noFill/>
+              </p:spPr>
+              <p:txBody>
+                <a:bodyPr wrap="square" rtlCol="0">
+                  <a:spAutoFit/>
+                </a:bodyPr>
+                <a:lstStyle/>
+                <a:p>
+                  <a:pPr algn="ctr"/>
+                  <a:r>
+                    <a:rPr lang="en-GB" dirty="0" smtClean="0"/>
+                    <a:t>15</a:t>
+                  </a:r>
+                  <a:endParaRPr lang="en-US" baseline="-25000" dirty="0"/>
+                </a:p>
+              </p:txBody>
+            </p:sp>
+            <p:sp>
+              <p:nvSpPr>
+                <p:cNvPr id="66" name="TextBox 65"/>
+                <p:cNvSpPr txBox="1"/>
+                <p:nvPr/>
+              </p:nvSpPr>
+              <p:spPr>
+                <a:xfrm>
+                  <a:off x="1522478" y="6323396"/>
+                  <a:ext cx="275661" cy="257136"/>
+                </a:xfrm>
+                <a:prstGeom prst="rect">
+                  <a:avLst/>
+                </a:prstGeom>
+                <a:noFill/>
+              </p:spPr>
+              <p:txBody>
+                <a:bodyPr wrap="square" rtlCol="0">
+                  <a:spAutoFit/>
+                </a:bodyPr>
+                <a:lstStyle/>
+                <a:p>
+                  <a:pPr algn="ctr"/>
+                  <a:r>
+                    <a:rPr lang="en-GB" dirty="0" smtClean="0"/>
+                    <a:t>1</a:t>
+                  </a:r>
+                  <a:endParaRPr lang="en-US" baseline="-25000" dirty="0"/>
+                </a:p>
+              </p:txBody>
+            </p:sp>
+          </p:grpSp>
         </p:grpSp>
         <p:grpSp>
           <p:nvGrpSpPr>
-            <p:cNvPr id="15" name="Group 110"/>
+            <p:cNvPr id="78" name="Group 77"/>
             <p:cNvGrpSpPr/>
             <p:nvPr/>
           </p:nvGrpSpPr>
           <p:grpSpPr>
             <a:xfrm>
-              <a:off x="3236318" y="5029660"/>
-              <a:ext cx="1544422" cy="214280"/>
-              <a:chOff x="1511428" y="6323408"/>
-              <a:chExt cx="1544422" cy="214280"/>
+              <a:off x="1112120" y="5102138"/>
+              <a:ext cx="840511" cy="3676920"/>
+              <a:chOff x="1112120" y="5102138"/>
+              <a:chExt cx="840511" cy="3676920"/>
             </a:xfrm>
           </p:grpSpPr>
-          <p:sp>
-            <p:nvSpPr>
-              <p:cNvPr id="25" name="TextBox 24"/>
-              <p:cNvSpPr txBox="1"/>
+          <p:grpSp>
+            <p:nvGrpSpPr>
+              <p:cNvPr id="70" name="Group 69"/>
+              <p:cNvGrpSpPr/>
               <p:nvPr/>
-            </p:nvSpPr>
-            <p:spPr>
+            </p:nvGrpSpPr>
+            <p:grpSpPr>
               <a:xfrm>
-                <a:off x="1860056" y="6323408"/>
-                <a:ext cx="275661" cy="214280"/>
+                <a:off x="1112120" y="7023199"/>
+                <a:ext cx="840511" cy="1755859"/>
+                <a:chOff x="844896" y="5102138"/>
+                <a:chExt cx="840511" cy="1755859"/>
               </a:xfrm>
-              <a:prstGeom prst="rect">
-                <a:avLst/>
-              </a:prstGeom>
-              <a:noFill/>
-            </p:spPr>
-            <p:txBody>
-              <a:bodyPr wrap="square" rtlCol="0">
-                <a:spAutoFit/>
-              </a:bodyPr>
-              <a:lstStyle/>
-              <a:p>
-                <a:r>
-                  <a:rPr lang="en-GB" sz="1400" dirty="0" smtClean="0"/>
-                  <a:t>5</a:t>
-                </a:r>
-                <a:endParaRPr lang="en-US" sz="1400" baseline="-25000" dirty="0"/>
-              </a:p>
-            </p:txBody>
-          </p:sp>
-          <p:sp>
-            <p:nvSpPr>
-              <p:cNvPr id="26" name="TextBox 25"/>
-              <p:cNvSpPr txBox="1"/>
+            </p:grpSpPr>
+            <p:sp>
+              <p:nvSpPr>
+                <p:cNvPr id="41" name="TextBox 40"/>
+                <p:cNvSpPr txBox="1"/>
+                <p:nvPr/>
+              </p:nvSpPr>
+              <p:spPr>
+                <a:xfrm>
+                  <a:off x="844896" y="5102138"/>
+                  <a:ext cx="840511" cy="369332"/>
+                </a:xfrm>
+                <a:prstGeom prst="rect">
+                  <a:avLst/>
+                </a:prstGeom>
+                <a:noFill/>
+              </p:spPr>
+              <p:txBody>
+                <a:bodyPr wrap="square" rtlCol="0">
+                  <a:spAutoFit/>
+                </a:bodyPr>
+                <a:lstStyle/>
+                <a:p>
+                  <a:pPr algn="r"/>
+                  <a:r>
+                    <a:rPr lang="en-US" dirty="0" smtClean="0"/>
+                    <a:t>100%</a:t>
+                  </a:r>
+                  <a:endParaRPr lang="en-US" dirty="0"/>
+                </a:p>
+              </p:txBody>
+            </p:sp>
+            <p:sp>
+              <p:nvSpPr>
+                <p:cNvPr id="42" name="TextBox 41"/>
+                <p:cNvSpPr txBox="1"/>
+                <p:nvPr/>
+              </p:nvSpPr>
+              <p:spPr>
+                <a:xfrm>
+                  <a:off x="968025" y="5567915"/>
+                  <a:ext cx="717382" cy="369332"/>
+                </a:xfrm>
+                <a:prstGeom prst="rect">
+                  <a:avLst/>
+                </a:prstGeom>
+                <a:noFill/>
+              </p:spPr>
+              <p:txBody>
+                <a:bodyPr wrap="square" rtlCol="0">
+                  <a:spAutoFit/>
+                </a:bodyPr>
+                <a:lstStyle/>
+                <a:p>
+                  <a:pPr algn="r"/>
+                  <a:r>
+                    <a:rPr lang="en-US" dirty="0" smtClean="0"/>
+                    <a:t>80%</a:t>
+                  </a:r>
+                  <a:endParaRPr lang="en-US" dirty="0"/>
+                </a:p>
+              </p:txBody>
+            </p:sp>
+            <p:sp>
+              <p:nvSpPr>
+                <p:cNvPr id="43" name="TextBox 42"/>
+                <p:cNvSpPr txBox="1"/>
+                <p:nvPr/>
+              </p:nvSpPr>
+              <p:spPr>
+                <a:xfrm>
+                  <a:off x="968025" y="6488665"/>
+                  <a:ext cx="717382" cy="369332"/>
+                </a:xfrm>
+                <a:prstGeom prst="rect">
+                  <a:avLst/>
+                </a:prstGeom>
+                <a:noFill/>
+              </p:spPr>
+              <p:txBody>
+                <a:bodyPr wrap="square" rtlCol="0">
+                  <a:spAutoFit/>
+                </a:bodyPr>
+                <a:lstStyle/>
+                <a:p>
+                  <a:pPr algn="r"/>
+                  <a:r>
+                    <a:rPr lang="en-US" dirty="0" smtClean="0"/>
+                    <a:t>40%</a:t>
+                  </a:r>
+                  <a:endParaRPr lang="en-US" dirty="0"/>
+                </a:p>
+              </p:txBody>
+            </p:sp>
+            <p:sp>
+              <p:nvSpPr>
+                <p:cNvPr id="46" name="TextBox 45"/>
+                <p:cNvSpPr txBox="1"/>
+                <p:nvPr/>
+              </p:nvSpPr>
+              <p:spPr>
+                <a:xfrm>
+                  <a:off x="968025" y="6029325"/>
+                  <a:ext cx="717382" cy="369332"/>
+                </a:xfrm>
+                <a:prstGeom prst="rect">
+                  <a:avLst/>
+                </a:prstGeom>
+                <a:noFill/>
+              </p:spPr>
+              <p:txBody>
+                <a:bodyPr wrap="square" rtlCol="0">
+                  <a:spAutoFit/>
+                </a:bodyPr>
+                <a:lstStyle/>
+                <a:p>
+                  <a:pPr algn="r"/>
+                  <a:r>
+                    <a:rPr lang="en-US" dirty="0" smtClean="0"/>
+                    <a:t>60%</a:t>
+                  </a:r>
+                  <a:endParaRPr lang="en-US" dirty="0"/>
+                </a:p>
+              </p:txBody>
+            </p:sp>
+          </p:grpSp>
+          <p:grpSp>
+            <p:nvGrpSpPr>
+              <p:cNvPr id="71" name="Group 70"/>
+              <p:cNvGrpSpPr/>
               <p:nvPr/>
-            </p:nvSpPr>
-            <p:spPr>
+            </p:nvGrpSpPr>
+            <p:grpSpPr>
               <a:xfrm>
-                <a:off x="2254139" y="6323408"/>
-                <a:ext cx="366657" cy="214280"/>
+                <a:off x="1112120" y="5102138"/>
+                <a:ext cx="840511" cy="1755859"/>
+                <a:chOff x="844896" y="5102138"/>
+                <a:chExt cx="840511" cy="1755859"/>
               </a:xfrm>
-              <a:prstGeom prst="rect">
-                <a:avLst/>
-              </a:prstGeom>
-              <a:noFill/>
-            </p:spPr>
-            <p:txBody>
-              <a:bodyPr wrap="square" rtlCol="0">
-                <a:spAutoFit/>
-              </a:bodyPr>
-              <a:lstStyle/>
-              <a:p>
-                <a:pPr algn="ctr"/>
-                <a:r>
-                  <a:rPr lang="en-GB" sz="1400" dirty="0" smtClean="0"/>
-                  <a:t>10</a:t>
-                </a:r>
-                <a:endParaRPr lang="en-US" sz="1400" baseline="-25000" dirty="0"/>
-              </a:p>
-            </p:txBody>
-          </p:sp>
-          <p:sp>
-            <p:nvSpPr>
-              <p:cNvPr id="27" name="TextBox 26"/>
-              <p:cNvSpPr txBox="1"/>
-              <p:nvPr/>
-            </p:nvSpPr>
-            <p:spPr>
-              <a:xfrm>
-                <a:off x="2689193" y="6323408"/>
-                <a:ext cx="366657" cy="214280"/>
-              </a:xfrm>
-              <a:prstGeom prst="rect">
-                <a:avLst/>
-              </a:prstGeom>
-              <a:noFill/>
-            </p:spPr>
-            <p:txBody>
-              <a:bodyPr wrap="square" rtlCol="0">
-                <a:spAutoFit/>
-              </a:bodyPr>
-              <a:lstStyle/>
-              <a:p>
-                <a:pPr algn="ctr"/>
-                <a:r>
-                  <a:rPr lang="en-GB" sz="1400" dirty="0" smtClean="0"/>
-                  <a:t>15</a:t>
-                </a:r>
-                <a:endParaRPr lang="en-US" sz="1400" baseline="-25000" dirty="0"/>
-              </a:p>
-            </p:txBody>
-          </p:sp>
-          <p:sp>
-            <p:nvSpPr>
-              <p:cNvPr id="28" name="TextBox 27"/>
-              <p:cNvSpPr txBox="1"/>
-              <p:nvPr/>
-            </p:nvSpPr>
-            <p:spPr>
-              <a:xfrm>
-                <a:off x="1511428" y="6323408"/>
-                <a:ext cx="275661" cy="214280"/>
-              </a:xfrm>
-              <a:prstGeom prst="rect">
-                <a:avLst/>
-              </a:prstGeom>
-              <a:noFill/>
-            </p:spPr>
-            <p:txBody>
-              <a:bodyPr wrap="square" rtlCol="0">
-                <a:spAutoFit/>
-              </a:bodyPr>
-              <a:lstStyle/>
-              <a:p>
-                <a:r>
-                  <a:rPr lang="en-GB" sz="1400" dirty="0" smtClean="0"/>
-                  <a:t>1</a:t>
-                </a:r>
-                <a:endParaRPr lang="en-US" sz="1400" baseline="-25000" dirty="0"/>
-              </a:p>
-            </p:txBody>
-          </p:sp>
+            </p:grpSpPr>
+            <p:sp>
+              <p:nvSpPr>
+                <p:cNvPr id="72" name="TextBox 71"/>
+                <p:cNvSpPr txBox="1"/>
+                <p:nvPr/>
+              </p:nvSpPr>
+              <p:spPr>
+                <a:xfrm>
+                  <a:off x="844896" y="5102138"/>
+                  <a:ext cx="840511" cy="369332"/>
+                </a:xfrm>
+                <a:prstGeom prst="rect">
+                  <a:avLst/>
+                </a:prstGeom>
+                <a:noFill/>
+              </p:spPr>
+              <p:txBody>
+                <a:bodyPr wrap="square" rtlCol="0">
+                  <a:spAutoFit/>
+                </a:bodyPr>
+                <a:lstStyle/>
+                <a:p>
+                  <a:pPr algn="r"/>
+                  <a:r>
+                    <a:rPr lang="en-US" dirty="0" smtClean="0"/>
+                    <a:t>100%</a:t>
+                  </a:r>
+                  <a:endParaRPr lang="en-US" dirty="0"/>
+                </a:p>
+              </p:txBody>
+            </p:sp>
+            <p:sp>
+              <p:nvSpPr>
+                <p:cNvPr id="73" name="TextBox 72"/>
+                <p:cNvSpPr txBox="1"/>
+                <p:nvPr/>
+              </p:nvSpPr>
+              <p:spPr>
+                <a:xfrm>
+                  <a:off x="968025" y="5567915"/>
+                  <a:ext cx="717382" cy="369332"/>
+                </a:xfrm>
+                <a:prstGeom prst="rect">
+                  <a:avLst/>
+                </a:prstGeom>
+                <a:noFill/>
+              </p:spPr>
+              <p:txBody>
+                <a:bodyPr wrap="square" rtlCol="0">
+                  <a:spAutoFit/>
+                </a:bodyPr>
+                <a:lstStyle/>
+                <a:p>
+                  <a:pPr algn="r"/>
+                  <a:r>
+                    <a:rPr lang="en-US" dirty="0" smtClean="0"/>
+                    <a:t>80%</a:t>
+                  </a:r>
+                  <a:endParaRPr lang="en-US" dirty="0"/>
+                </a:p>
+              </p:txBody>
+            </p:sp>
+            <p:sp>
+              <p:nvSpPr>
+                <p:cNvPr id="74" name="TextBox 73"/>
+                <p:cNvSpPr txBox="1"/>
+                <p:nvPr/>
+              </p:nvSpPr>
+              <p:spPr>
+                <a:xfrm>
+                  <a:off x="968025" y="6488665"/>
+                  <a:ext cx="717382" cy="369332"/>
+                </a:xfrm>
+                <a:prstGeom prst="rect">
+                  <a:avLst/>
+                </a:prstGeom>
+                <a:noFill/>
+              </p:spPr>
+              <p:txBody>
+                <a:bodyPr wrap="square" rtlCol="0">
+                  <a:spAutoFit/>
+                </a:bodyPr>
+                <a:lstStyle/>
+                <a:p>
+                  <a:pPr algn="r"/>
+                  <a:r>
+                    <a:rPr lang="en-US" dirty="0" smtClean="0"/>
+                    <a:t>40%</a:t>
+                  </a:r>
+                  <a:endParaRPr lang="en-US" dirty="0"/>
+                </a:p>
+              </p:txBody>
+            </p:sp>
+            <p:sp>
+              <p:nvSpPr>
+                <p:cNvPr id="75" name="TextBox 74"/>
+                <p:cNvSpPr txBox="1"/>
+                <p:nvPr/>
+              </p:nvSpPr>
+              <p:spPr>
+                <a:xfrm>
+                  <a:off x="968025" y="6029325"/>
+                  <a:ext cx="717382" cy="369332"/>
+                </a:xfrm>
+                <a:prstGeom prst="rect">
+                  <a:avLst/>
+                </a:prstGeom>
+                <a:noFill/>
+              </p:spPr>
+              <p:txBody>
+                <a:bodyPr wrap="square" rtlCol="0">
+                  <a:spAutoFit/>
+                </a:bodyPr>
+                <a:lstStyle/>
+                <a:p>
+                  <a:pPr algn="r"/>
+                  <a:r>
+                    <a:rPr lang="en-US" dirty="0" smtClean="0"/>
+                    <a:t>60%</a:t>
+                  </a:r>
+                  <a:endParaRPr lang="en-US" dirty="0"/>
+                </a:p>
+              </p:txBody>
+            </p:sp>
+          </p:grpSp>
         </p:grpSp>
-        <p:sp>
-          <p:nvSpPr>
-            <p:cNvPr id="16" name="TextBox 15"/>
-            <p:cNvSpPr txBox="1"/>
-            <p:nvPr/>
-          </p:nvSpPr>
-          <p:spPr>
-            <a:xfrm rot="16200000">
-              <a:off x="465488" y="5781634"/>
-              <a:ext cx="1368659" cy="278564"/>
-            </a:xfrm>
-            <a:prstGeom prst="rect">
-              <a:avLst/>
-            </a:prstGeom>
-            <a:noFill/>
-          </p:spPr>
-          <p:txBody>
-            <a:bodyPr wrap="square" rtlCol="0">
-              <a:spAutoFit/>
-            </a:bodyPr>
-            <a:lstStyle/>
-            <a:p>
-              <a:pPr algn="ctr"/>
-              <a:r>
-                <a:rPr lang="en-GB" sz="2000" b="1" dirty="0" smtClean="0"/>
-                <a:t>% choose target</a:t>
-              </a:r>
-              <a:endParaRPr lang="en-US" sz="2000" b="1" baseline="-25000" dirty="0"/>
-            </a:p>
-          </p:txBody>
-        </p:sp>
-        <p:grpSp>
-          <p:nvGrpSpPr>
-            <p:cNvPr id="17" name="Group 117"/>
-            <p:cNvGrpSpPr/>
-            <p:nvPr/>
-          </p:nvGrpSpPr>
-          <p:grpSpPr>
-            <a:xfrm>
-              <a:off x="1064079" y="5304190"/>
-              <a:ext cx="585180" cy="1183045"/>
-              <a:chOff x="1064079" y="3680676"/>
-              <a:chExt cx="585180" cy="1183045"/>
-            </a:xfrm>
-          </p:grpSpPr>
-          <p:sp>
-            <p:nvSpPr>
-              <p:cNvPr id="22" name="TextBox 21"/>
-              <p:cNvSpPr txBox="1"/>
-              <p:nvPr/>
-            </p:nvSpPr>
-            <p:spPr>
-              <a:xfrm>
-                <a:off x="1064079" y="3680676"/>
-                <a:ext cx="585180" cy="192852"/>
-              </a:xfrm>
-              <a:prstGeom prst="rect">
-                <a:avLst/>
-              </a:prstGeom>
-              <a:noFill/>
-            </p:spPr>
-            <p:txBody>
-              <a:bodyPr wrap="square" rtlCol="0">
-                <a:spAutoFit/>
-              </a:bodyPr>
-              <a:lstStyle/>
-              <a:p>
-                <a:pPr algn="r"/>
-                <a:r>
-                  <a:rPr lang="en-US" sz="1200" dirty="0" smtClean="0"/>
-                  <a:t>1.0</a:t>
-                </a:r>
-                <a:endParaRPr lang="en-US" sz="1200" dirty="0"/>
-              </a:p>
-            </p:txBody>
-          </p:sp>
-          <p:sp>
-            <p:nvSpPr>
-              <p:cNvPr id="23" name="TextBox 22"/>
-              <p:cNvSpPr txBox="1"/>
-              <p:nvPr/>
-            </p:nvSpPr>
-            <p:spPr>
-              <a:xfrm>
-                <a:off x="1149804" y="4159858"/>
-                <a:ext cx="499455" cy="192852"/>
-              </a:xfrm>
-              <a:prstGeom prst="rect">
-                <a:avLst/>
-              </a:prstGeom>
-              <a:noFill/>
-            </p:spPr>
-            <p:txBody>
-              <a:bodyPr wrap="square" rtlCol="0">
-                <a:spAutoFit/>
-              </a:bodyPr>
-              <a:lstStyle/>
-              <a:p>
-                <a:pPr algn="r"/>
-                <a:r>
-                  <a:rPr lang="en-US" sz="1200" dirty="0" smtClean="0"/>
-                  <a:t>0.5</a:t>
-                </a:r>
-                <a:endParaRPr lang="en-US" sz="1200" dirty="0"/>
-              </a:p>
-            </p:txBody>
-          </p:sp>
-          <p:sp>
-            <p:nvSpPr>
-              <p:cNvPr id="24" name="TextBox 23"/>
-              <p:cNvSpPr txBox="1"/>
-              <p:nvPr/>
-            </p:nvSpPr>
-            <p:spPr>
-              <a:xfrm>
-                <a:off x="1149803" y="4670869"/>
-                <a:ext cx="499455" cy="192852"/>
-              </a:xfrm>
-              <a:prstGeom prst="rect">
-                <a:avLst/>
-              </a:prstGeom>
-              <a:noFill/>
-            </p:spPr>
-            <p:txBody>
-              <a:bodyPr wrap="square" rtlCol="0">
-                <a:spAutoFit/>
-              </a:bodyPr>
-              <a:lstStyle/>
-              <a:p>
-                <a:pPr algn="r"/>
-                <a:r>
-                  <a:rPr lang="en-US" sz="1200" dirty="0" smtClean="0"/>
-                  <a:t>0.0</a:t>
-                </a:r>
-                <a:endParaRPr lang="en-US" sz="1200" dirty="0"/>
-              </a:p>
-            </p:txBody>
-          </p:sp>
-        </p:grpSp>
-        <p:sp>
-          <p:nvSpPr>
-            <p:cNvPr id="18" name="TextBox 17"/>
-            <p:cNvSpPr txBox="1"/>
-            <p:nvPr/>
-          </p:nvSpPr>
-          <p:spPr>
-            <a:xfrm>
-              <a:off x="1649259" y="6669808"/>
-              <a:ext cx="1318308" cy="278565"/>
-            </a:xfrm>
-            <a:prstGeom prst="rect">
-              <a:avLst/>
-            </a:prstGeom>
-            <a:noFill/>
-          </p:spPr>
-          <p:txBody>
-            <a:bodyPr wrap="square" rtlCol="0" anchor="ctr">
-              <a:spAutoFit/>
-            </a:bodyPr>
-            <a:lstStyle/>
-            <a:p>
-              <a:pPr algn="ctr"/>
-              <a:r>
-                <a:rPr lang="en-GB" sz="2000" b="1" dirty="0" smtClean="0"/>
-                <a:t>trial</a:t>
-              </a:r>
-              <a:endParaRPr lang="en-US" sz="2000" b="1" baseline="-25000" dirty="0"/>
-            </a:p>
-          </p:txBody>
-        </p:sp>
-        <p:sp>
-          <p:nvSpPr>
-            <p:cNvPr id="19" name="TextBox 18"/>
-            <p:cNvSpPr txBox="1"/>
-            <p:nvPr/>
-          </p:nvSpPr>
-          <p:spPr>
-            <a:xfrm>
-              <a:off x="3377978" y="6669808"/>
-              <a:ext cx="1318308" cy="278565"/>
-            </a:xfrm>
-            <a:prstGeom prst="rect">
-              <a:avLst/>
-            </a:prstGeom>
-            <a:noFill/>
-          </p:spPr>
-          <p:txBody>
-            <a:bodyPr wrap="square" rtlCol="0" anchor="ctr">
-              <a:spAutoFit/>
-            </a:bodyPr>
-            <a:lstStyle/>
-            <a:p>
-              <a:pPr algn="ctr"/>
-              <a:r>
-                <a:rPr lang="en-GB" sz="2000" b="1" dirty="0" smtClean="0"/>
-                <a:t>trial</a:t>
-              </a:r>
-              <a:endParaRPr lang="en-US" sz="2000" b="1" baseline="-25000" dirty="0"/>
-            </a:p>
-          </p:txBody>
-        </p:sp>
-        <p:sp>
-          <p:nvSpPr>
-            <p:cNvPr id="20" name="TextBox 19"/>
-            <p:cNvSpPr txBox="1"/>
-            <p:nvPr/>
-          </p:nvSpPr>
-          <p:spPr>
-            <a:xfrm>
-              <a:off x="3236318" y="3740553"/>
-              <a:ext cx="1771815" cy="332561"/>
-            </a:xfrm>
-            <a:prstGeom prst="rect">
-              <a:avLst/>
-            </a:prstGeom>
-            <a:noFill/>
-          </p:spPr>
-          <p:txBody>
-            <a:bodyPr wrap="square" lIns="107287" tIns="53643" rIns="107287" bIns="53643" rtlCol="0" anchor="ctr">
-              <a:spAutoFit/>
-            </a:bodyPr>
-            <a:lstStyle/>
-            <a:p>
-              <a:pPr algn="ctr"/>
-              <a:r>
-                <a:rPr lang="en-US" sz="2400" dirty="0" smtClean="0">
-                  <a:solidFill>
-                    <a:srgbClr val="00FF00"/>
-                  </a:solidFill>
-                </a:rPr>
-                <a:t>Novel</a:t>
-              </a:r>
-              <a:endParaRPr lang="en-US" sz="2400" dirty="0">
-                <a:solidFill>
-                  <a:srgbClr val="00FF00"/>
-                </a:solidFill>
-              </a:endParaRPr>
-            </a:p>
-          </p:txBody>
-        </p:sp>
-        <p:sp>
-          <p:nvSpPr>
-            <p:cNvPr id="21" name="TextBox 20"/>
-            <p:cNvSpPr txBox="1"/>
-            <p:nvPr/>
-          </p:nvSpPr>
-          <p:spPr>
-            <a:xfrm>
-              <a:off x="1368230" y="3740553"/>
-              <a:ext cx="1771815" cy="332561"/>
-            </a:xfrm>
-            <a:prstGeom prst="rect">
-              <a:avLst/>
-            </a:prstGeom>
-            <a:noFill/>
-          </p:spPr>
-          <p:txBody>
-            <a:bodyPr wrap="square" lIns="107287" tIns="53643" rIns="107287" bIns="53643" rtlCol="0" anchor="ctr">
-              <a:spAutoFit/>
-            </a:bodyPr>
-            <a:lstStyle/>
-            <a:p>
-              <a:pPr algn="ctr"/>
-              <a:r>
-                <a:rPr lang="en-US" sz="2400" dirty="0" smtClean="0">
-                  <a:solidFill>
-                    <a:srgbClr val="FF0000"/>
-                  </a:solidFill>
-                </a:rPr>
-                <a:t>Familiar</a:t>
-              </a:r>
-              <a:endParaRPr lang="en-US" sz="2400" dirty="0">
-                <a:solidFill>
-                  <a:srgbClr val="FF0000"/>
-                </a:solidFill>
-              </a:endParaRPr>
-            </a:p>
-          </p:txBody>
-        </p:sp>
       </p:grpSp>
     </p:spTree>
   </p:cSld>

</xml_diff>